<commit_message>
change the results for dataset 2
</commit_message>
<xml_diff>
--- a/presentation/sports_betting_term4.pptx
+++ b/presentation/sports_betting_term4.pptx
@@ -2881,7 +2881,7 @@
           <a:p>
             <a:fld id="{049BF167-0F2A-491A-9224-D62CDB49146A}" type="datetimeFigureOut">
               <a:rPr lang="en-US" smtClean="0"/>
-              <a:t>5/13/2024</a:t>
+              <a:t>5/15/2024</a:t>
             </a:fld>
             <a:endParaRPr lang="en-US"/>
           </a:p>
@@ -5153,7 +5153,7 @@
           <a:p>
             <a:fld id="{AA58F0C6-9703-47D7-8233-838C756D61C9}" type="datetimeFigureOut">
               <a:rPr lang="en-US" smtClean="0"/>
-              <a:t>5/13/2024</a:t>
+              <a:t>5/15/2024</a:t>
             </a:fld>
             <a:endParaRPr lang="en-US"/>
           </a:p>
@@ -5351,7 +5351,7 @@
           <a:p>
             <a:fld id="{AA58F0C6-9703-47D7-8233-838C756D61C9}" type="datetimeFigureOut">
               <a:rPr lang="en-US" smtClean="0"/>
-              <a:t>5/13/2024</a:t>
+              <a:t>5/15/2024</a:t>
             </a:fld>
             <a:endParaRPr lang="en-US"/>
           </a:p>
@@ -5559,7 +5559,7 @@
           <a:p>
             <a:fld id="{AA58F0C6-9703-47D7-8233-838C756D61C9}" type="datetimeFigureOut">
               <a:rPr lang="en-US" smtClean="0"/>
-              <a:t>5/13/2024</a:t>
+              <a:t>5/15/2024</a:t>
             </a:fld>
             <a:endParaRPr lang="en-US"/>
           </a:p>
@@ -6346,7 +6346,7 @@
           <a:p>
             <a:fld id="{AA58F0C6-9703-47D7-8233-838C756D61C9}" type="datetimeFigureOut">
               <a:rPr lang="en-US" smtClean="0"/>
-              <a:t>5/13/2024</a:t>
+              <a:t>5/15/2024</a:t>
             </a:fld>
             <a:endParaRPr lang="en-US"/>
           </a:p>
@@ -6621,7 +6621,7 @@
           <a:p>
             <a:fld id="{AA58F0C6-9703-47D7-8233-838C756D61C9}" type="datetimeFigureOut">
               <a:rPr lang="en-US" smtClean="0"/>
-              <a:t>5/13/2024</a:t>
+              <a:t>5/15/2024</a:t>
             </a:fld>
             <a:endParaRPr lang="en-US"/>
           </a:p>
@@ -6886,7 +6886,7 @@
           <a:p>
             <a:fld id="{AA58F0C6-9703-47D7-8233-838C756D61C9}" type="datetimeFigureOut">
               <a:rPr lang="en-US" smtClean="0"/>
-              <a:t>5/13/2024</a:t>
+              <a:t>5/15/2024</a:t>
             </a:fld>
             <a:endParaRPr lang="en-US"/>
           </a:p>
@@ -7298,7 +7298,7 @@
           <a:p>
             <a:fld id="{AA58F0C6-9703-47D7-8233-838C756D61C9}" type="datetimeFigureOut">
               <a:rPr lang="en-US" smtClean="0"/>
-              <a:t>5/13/2024</a:t>
+              <a:t>5/15/2024</a:t>
             </a:fld>
             <a:endParaRPr lang="en-US"/>
           </a:p>
@@ -7439,7 +7439,7 @@
           <a:p>
             <a:fld id="{AA58F0C6-9703-47D7-8233-838C756D61C9}" type="datetimeFigureOut">
               <a:rPr lang="en-US" smtClean="0"/>
-              <a:t>5/13/2024</a:t>
+              <a:t>5/15/2024</a:t>
             </a:fld>
             <a:endParaRPr lang="en-US"/>
           </a:p>
@@ -7552,7 +7552,7 @@
           <a:p>
             <a:fld id="{AA58F0C6-9703-47D7-8233-838C756D61C9}" type="datetimeFigureOut">
               <a:rPr lang="en-US" smtClean="0"/>
-              <a:t>5/13/2024</a:t>
+              <a:t>5/15/2024</a:t>
             </a:fld>
             <a:endParaRPr lang="en-US"/>
           </a:p>
@@ -7863,7 +7863,7 @@
           <a:p>
             <a:fld id="{AA58F0C6-9703-47D7-8233-838C756D61C9}" type="datetimeFigureOut">
               <a:rPr lang="en-US" smtClean="0"/>
-              <a:t>5/13/2024</a:t>
+              <a:t>5/15/2024</a:t>
             </a:fld>
             <a:endParaRPr lang="en-US"/>
           </a:p>
@@ -8151,7 +8151,7 @@
           <a:p>
             <a:fld id="{AA58F0C6-9703-47D7-8233-838C756D61C9}" type="datetimeFigureOut">
               <a:rPr lang="en-US" smtClean="0"/>
-              <a:t>5/13/2024</a:t>
+              <a:t>5/15/2024</a:t>
             </a:fld>
             <a:endParaRPr lang="en-US"/>
           </a:p>
@@ -8392,7 +8392,7 @@
           <a:p>
             <a:fld id="{AA58F0C6-9703-47D7-8233-838C756D61C9}" type="datetimeFigureOut">
               <a:rPr lang="en-US" smtClean="0"/>
-              <a:t>5/13/2024</a:t>
+              <a:t>5/15/2024</a:t>
             </a:fld>
             <a:endParaRPr lang="en-US"/>
           </a:p>
@@ -17538,7 +17538,7 @@
           <p:nvPr>
             <p:extLst>
               <p:ext uri="{D42A27DB-BD31-4B8C-83A1-F6EECF244321}">
-                <p14:modId xmlns:p14="http://schemas.microsoft.com/office/powerpoint/2010/main" val="1111326868"/>
+                <p14:modId xmlns:p14="http://schemas.microsoft.com/office/powerpoint/2010/main" val="390640286"/>
               </p:ext>
             </p:extLst>
           </p:nvPr>
@@ -17740,7 +17740,7 @@
                     <a:p>
                       <a:r>
                         <a:rPr lang="en-US" dirty="0"/>
-                        <a:t>0.9541276</a:t>
+                        <a:t>1</a:t>
                       </a:r>
                     </a:p>
                   </a:txBody>
@@ -17770,7 +17770,7 @@
                       </a:pPr>
                       <a:r>
                         <a:rPr lang="en-US" dirty="0"/>
-                        <a:t>4.2 e-176</a:t>
+                        <a:t>1</a:t>
                       </a:r>
                     </a:p>
                   </a:txBody>
@@ -17800,7 +17800,7 @@
                       </a:pPr>
                       <a:r>
                         <a:rPr lang="en-US" dirty="0"/>
-                        <a:t>0.9541276</a:t>
+                        <a:t>1</a:t>
                       </a:r>
                     </a:p>
                   </a:txBody>
@@ -17830,7 +17830,7 @@
                       </a:pPr>
                       <a:r>
                         <a:rPr lang="en-US" dirty="0"/>
-                        <a:t>4.2 e-176</a:t>
+                        <a:t>1 (didn’t bet)</a:t>
                       </a:r>
                     </a:p>
                   </a:txBody>
@@ -17877,7 +17877,7 @@
                     <a:p>
                       <a:r>
                         <a:rPr lang="en-US" dirty="0"/>
-                        <a:t>0.9553148</a:t>
+                        <a:t>1.000617</a:t>
                       </a:r>
                     </a:p>
                   </a:txBody>
@@ -17907,7 +17907,7 @@
                       </a:pPr>
                       <a:r>
                         <a:rPr lang="en-US" dirty="0"/>
-                        <a:t>1.3 e-171</a:t>
+                        <a:t>186.6</a:t>
                       </a:r>
                     </a:p>
                   </a:txBody>
@@ -17937,7 +17937,7 @@
                       </a:pPr>
                       <a:r>
                         <a:rPr lang="en-US" dirty="0"/>
-                        <a:t>0.9534331</a:t>
+                        <a:t>0.9994983</a:t>
                       </a:r>
                     </a:p>
                   </a:txBody>
@@ -17967,7 +17967,7 @@
                       </a:pPr>
                       <a:r>
                         <a:rPr lang="en-US" dirty="0"/>
-                        <a:t>1.1 e-180</a:t>
+                        <a:t>0.002</a:t>
                       </a:r>
                     </a:p>
                   </a:txBody>

</xml_diff>